<commit_message>
Edit PPT 2 - Correcting typo
</commit_message>
<xml_diff>
--- a/PPT/DAA 2 - Analisis Algoritma Rekursif dan Nonrekursif.pptx
+++ b/PPT/DAA 2 - Analisis Algoritma Rekursif dan Nonrekursif.pptx
@@ -220,7 +220,7 @@
           <a:p>
             <a:fld id="{B60B7805-B9FD-4C32-A93C-0C6703F9F31A}" type="datetimeFigureOut">
               <a:rPr lang="id-ID" smtClean="0"/>
-              <a:t>21/08/2017</a:t>
+              <a:t>24/08/2017</a:t>
             </a:fld>
             <a:endParaRPr lang="id-ID"/>
           </a:p>
@@ -712,7 +712,7 @@
           <a:p>
             <a:fld id="{3170C29B-1F46-4065-BB6A-BB18C2CC3EEA}" type="datetime1">
               <a:rPr lang="en-US" smtClean="0"/>
-              <a:t>8/21/2017</a:t>
+              <a:t>8/24/2017</a:t>
             </a:fld>
             <a:endParaRPr lang="en-US" dirty="0"/>
           </a:p>
@@ -882,7 +882,7 @@
           <a:p>
             <a:fld id="{F6AFBD1D-7D9A-415B-A4D6-979ADA1D8678}" type="datetime1">
               <a:rPr lang="en-US" smtClean="0"/>
-              <a:t>8/21/2017</a:t>
+              <a:t>8/24/2017</a:t>
             </a:fld>
             <a:endParaRPr lang="en-US" dirty="0"/>
           </a:p>
@@ -1062,7 +1062,7 @@
           <a:p>
             <a:fld id="{891C6DD8-8CBF-4F54-8D5A-BD5E034A58A2}" type="datetime1">
               <a:rPr lang="en-US" smtClean="0"/>
-              <a:t>8/21/2017</a:t>
+              <a:t>8/24/2017</a:t>
             </a:fld>
             <a:endParaRPr lang="en-US" dirty="0"/>
           </a:p>
@@ -1232,7 +1232,7 @@
           <a:p>
             <a:fld id="{1936C64A-042C-4711-A26E-BC46B11CB924}" type="datetime1">
               <a:rPr lang="en-US" smtClean="0"/>
-              <a:t>8/21/2017</a:t>
+              <a:t>8/24/2017</a:t>
             </a:fld>
             <a:endParaRPr lang="en-US" dirty="0"/>
           </a:p>
@@ -1490,7 +1490,7 @@
           <a:p>
             <a:fld id="{8422759D-3C55-49E3-8BCB-CA303F297AA4}" type="datetime1">
               <a:rPr lang="en-US" smtClean="0"/>
-              <a:t>8/21/2017</a:t>
+              <a:t>8/24/2017</a:t>
             </a:fld>
             <a:endParaRPr lang="en-US" dirty="0"/>
           </a:p>
@@ -1778,7 +1778,7 @@
           <a:p>
             <a:fld id="{2076BA79-3872-47B0-A1D0-8E62DB2F42A5}" type="datetime1">
               <a:rPr lang="en-US" smtClean="0"/>
-              <a:t>8/21/2017</a:t>
+              <a:t>8/24/2017</a:t>
             </a:fld>
             <a:endParaRPr lang="en-US" dirty="0"/>
           </a:p>
@@ -2220,7 +2220,7 @@
           <a:p>
             <a:fld id="{01B649D1-2A4D-4693-ABF6-59AE0A3ECDDA}" type="datetime1">
               <a:rPr lang="en-US" smtClean="0"/>
-              <a:t>8/21/2017</a:t>
+              <a:t>8/24/2017</a:t>
             </a:fld>
             <a:endParaRPr lang="en-US" dirty="0"/>
           </a:p>
@@ -2338,7 +2338,7 @@
           <a:p>
             <a:fld id="{B1788103-35BF-4B9A-A98F-1BEB5B5536AA}" type="datetime1">
               <a:rPr lang="en-US" smtClean="0"/>
-              <a:t>8/21/2017</a:t>
+              <a:t>8/24/2017</a:t>
             </a:fld>
             <a:endParaRPr lang="en-US" dirty="0"/>
           </a:p>
@@ -2433,7 +2433,7 @@
           <a:p>
             <a:fld id="{DF2F651C-8506-4529-899D-013536B4A97A}" type="datetime1">
               <a:rPr lang="en-US" smtClean="0"/>
-              <a:t>8/21/2017</a:t>
+              <a:t>8/24/2017</a:t>
             </a:fld>
             <a:endParaRPr lang="en-US" dirty="0"/>
           </a:p>
@@ -2721,7 +2721,7 @@
           <a:p>
             <a:fld id="{9D3D66A1-B06C-4C28-8316-2FC1EB4E13C8}" type="datetime1">
               <a:rPr lang="en-US" smtClean="0"/>
-              <a:t>8/21/2017</a:t>
+              <a:t>8/24/2017</a:t>
             </a:fld>
             <a:endParaRPr lang="en-US" dirty="0"/>
           </a:p>
@@ -2994,7 +2994,7 @@
           <a:p>
             <a:fld id="{BBDA6D02-0FE8-47DF-A57D-1A4271039073}" type="datetime1">
               <a:rPr lang="en-US" smtClean="0"/>
-              <a:t>8/21/2017</a:t>
+              <a:t>8/24/2017</a:t>
             </a:fld>
             <a:endParaRPr lang="en-US" dirty="0"/>
           </a:p>
@@ -3291,7 +3291,7 @@
           <a:p>
             <a:fld id="{F0BF2728-9A15-4D58-A0A3-9C289FDE191A}" type="datetime1">
               <a:rPr lang="en-US" smtClean="0"/>
-              <a:t>8/21/2017</a:t>
+              <a:t>8/24/2017</a:t>
             </a:fld>
             <a:endParaRPr lang="en-US" dirty="0"/>
           </a:p>
@@ -5736,7 +5736,15 @@
             </a:pPr>
             <a:r>
               <a:rPr lang="id-ID" dirty="0" smtClean="0"/>
-              <a:t>Worst case dan base case berbeda</a:t>
+              <a:t>Worst case dan </a:t>
+            </a:r>
+            <a:r>
+              <a:rPr lang="id-ID" dirty="0" smtClean="0"/>
+              <a:t>best </a:t>
+            </a:r>
+            <a:r>
+              <a:rPr lang="id-ID" dirty="0" smtClean="0"/>
+              <a:t>case berbeda</a:t>
             </a:r>
             <a:endParaRPr lang="id-ID" dirty="0"/>
           </a:p>
@@ -11280,7 +11288,15 @@
             </a:pPr>
             <a:r>
               <a:rPr lang="id-ID" dirty="0" smtClean="0"/>
-              <a:t>Tidak membedakan worst case dan base case</a:t>
+              <a:t>Tidak membedakan worst case dan </a:t>
+            </a:r>
+            <a:r>
+              <a:rPr lang="id-ID" dirty="0" smtClean="0"/>
+              <a:t>best </a:t>
+            </a:r>
+            <a:r>
+              <a:rPr lang="id-ID" dirty="0" smtClean="0"/>
+              <a:t>case</a:t>
             </a:r>
             <a:endParaRPr lang="id-ID" dirty="0"/>
           </a:p>
@@ -22737,7 +22753,15 @@
             </a:pPr>
             <a:r>
               <a:rPr lang="id-ID" dirty="0" smtClean="0"/>
-              <a:t>Worst case dan base case sama</a:t>
+              <a:t>Worst case dan </a:t>
+            </a:r>
+            <a:r>
+              <a:rPr lang="id-ID" dirty="0" smtClean="0"/>
+              <a:t>best </a:t>
+            </a:r>
+            <a:r>
+              <a:rPr lang="id-ID" dirty="0" smtClean="0"/>
+              <a:t>case sama</a:t>
             </a:r>
             <a:endParaRPr lang="id-ID" dirty="0"/>
           </a:p>

</xml_diff>